<commit_message>
#0000 Test: Update of test cases
</commit_message>
<xml_diff>
--- a/src/test/resources/templates/sales.pptx
+++ b/src/test/resources/templates/sales.pptx
@@ -5,11 +5,10 @@
     <p:sldMasterId id="2147483648" r:id="rId1"/>
   </p:sldMasterIdLst>
   <p:notesMasterIdLst>
-    <p:notesMasterId r:id="rId4"/>
+    <p:notesMasterId r:id="rId3"/>
   </p:notesMasterIdLst>
   <p:sldIdLst>
     <p:sldId id="276" r:id="rId2"/>
-    <p:sldId id="343" r:id="rId3"/>
   </p:sldIdLst>
   <p:sldSz cx="12192000" cy="6858000"/>
   <p:notesSz cx="6858000" cy="9144000"/>
@@ -110,7 +109,7 @@
   </p:defaultTextStyle>
   <p:extLst>
     <p:ext uri="{EFAFB233-063F-42B5-8137-9DF3F51BA10A}">
-      <p15:sldGuideLst xmlns:p15="http://schemas.microsoft.com/office/powerpoint/2012/main" xmlns="">
+      <p15:sldGuideLst xmlns="" xmlns:p15="http://schemas.microsoft.com/office/powerpoint/2012/main">
         <p15:guide id="1" orient="horz" pos="2304" userDrawn="1">
           <p15:clr>
             <a:srgbClr val="A4A3A4"/>
@@ -1004,11 +1003,11 @@
         </c:dLbls>
         <c:gapWidth val="150"/>
         <c:overlap val="100"/>
-        <c:axId val="169742848"/>
-        <c:axId val="170499392"/>
+        <c:axId val="170861056"/>
+        <c:axId val="200901184"/>
       </c:barChart>
       <c:catAx>
-        <c:axId val="169742848"/>
+        <c:axId val="170861056"/>
         <c:scaling>
           <c:orientation val="minMax"/>
         </c:scaling>
@@ -1018,7 +1017,7 @@
         <c:majorTickMark val="out"/>
         <c:minorTickMark val="none"/>
         <c:tickLblPos val="nextTo"/>
-        <c:crossAx val="170499392"/>
+        <c:crossAx val="200901184"/>
         <c:crosses val="autoZero"/>
         <c:auto val="1"/>
         <c:lblAlgn val="ctr"/>
@@ -1026,7 +1025,7 @@
         <c:noMultiLvlLbl val="0"/>
       </c:catAx>
       <c:valAx>
-        <c:axId val="170499392"/>
+        <c:axId val="200901184"/>
         <c:scaling>
           <c:orientation val="minMax"/>
         </c:scaling>
@@ -1036,7 +1035,7 @@
         <c:majorTickMark val="out"/>
         <c:minorTickMark val="none"/>
         <c:tickLblPos val="nextTo"/>
-        <c:crossAx val="169742848"/>
+        <c:crossAx val="170861056"/>
         <c:crosses val="autoZero"/>
         <c:crossBetween val="between"/>
       </c:valAx>
@@ -1988,11 +1987,11 @@
         </c:dLbls>
         <c:marker val="1"/>
         <c:smooth val="0"/>
-        <c:axId val="169785856"/>
-        <c:axId val="146271616"/>
+        <c:axId val="201234944"/>
+        <c:axId val="200905792"/>
       </c:lineChart>
       <c:catAx>
-        <c:axId val="169785856"/>
+        <c:axId val="201234944"/>
         <c:scaling>
           <c:orientation val="minMax"/>
         </c:scaling>
@@ -2034,7 +2033,7 @@
             <a:endParaRPr lang="de-DE"/>
           </a:p>
         </c:txPr>
-        <c:crossAx val="146271616"/>
+        <c:crossAx val="200905792"/>
         <c:crosses val="autoZero"/>
         <c:auto val="1"/>
         <c:lblAlgn val="ctr"/>
@@ -2042,7 +2041,7 @@
         <c:noMultiLvlLbl val="0"/>
       </c:catAx>
       <c:valAx>
-        <c:axId val="146271616"/>
+        <c:axId val="200905792"/>
         <c:scaling>
           <c:orientation val="minMax"/>
         </c:scaling>
@@ -2084,7 +2083,7 @@
             <a:endParaRPr lang="de-DE"/>
           </a:p>
         </c:txPr>
-        <c:crossAx val="169785856"/>
+        <c:crossAx val="201234944"/>
         <c:crosses val="autoZero"/>
         <c:crossBetween val="between"/>
       </c:valAx>
@@ -3133,7 +3132,7 @@
             <a:fld id="{CFA2C9E7-200F-452C-857E-F8B7901E52A8}" type="datetimeFigureOut">
               <a:rPr lang="en-US" smtClean="0"/>
               <a:pPr/>
-              <a:t>6/26/2021</a:t>
+              <a:t>6/28/2021</a:t>
             </a:fld>
             <a:endParaRPr lang="en-US"/>
           </a:p>
@@ -3433,7 +3432,7 @@
           <p:cNvPr id="7" name="Rectangle 6">
             <a:extLst>
               <a:ext uri="{FF2B5EF4-FFF2-40B4-BE49-F238E27FC236}">
-                <a16:creationId xmlns:a16="http://schemas.microsoft.com/office/drawing/2014/main" xmlns="" id="{86AA50C8-646C-8249-9B3B-150F0E8CC75C}"/>
+                <a16:creationId xmlns="" xmlns:a16="http://schemas.microsoft.com/office/drawing/2014/main" id="{86AA50C8-646C-8249-9B3B-150F0E8CC75C}"/>
               </a:ext>
             </a:extLst>
           </p:cNvPr>
@@ -3487,7 +3486,7 @@
           <p:cNvPr id="5" name="Straight Connector 4">
             <a:extLst>
               <a:ext uri="{FF2B5EF4-FFF2-40B4-BE49-F238E27FC236}">
-                <a16:creationId xmlns:a16="http://schemas.microsoft.com/office/drawing/2014/main" xmlns="" id="{91A754AC-F8F9-6B4B-969A-3A253056CC6D}"/>
+                <a16:creationId xmlns="" xmlns:a16="http://schemas.microsoft.com/office/drawing/2014/main" id="{91A754AC-F8F9-6B4B-969A-3A253056CC6D}"/>
               </a:ext>
             </a:extLst>
           </p:cNvPr>
@@ -3533,7 +3532,7 @@
           <p:cNvPr id="6" name="Chart 5">
             <a:extLst>
               <a:ext uri="{FF2B5EF4-FFF2-40B4-BE49-F238E27FC236}">
-                <a16:creationId xmlns:a16="http://schemas.microsoft.com/office/drawing/2014/main" xmlns="" id="{47E814FA-EAE6-BB47-B255-C0D77BD316B5}"/>
+                <a16:creationId xmlns="" xmlns:a16="http://schemas.microsoft.com/office/drawing/2014/main" id="{47E814FA-EAE6-BB47-B255-C0D77BD316B5}"/>
               </a:ext>
             </a:extLst>
           </p:cNvPr>
@@ -3561,7 +3560,7 @@
           <p:cNvPr id="8" name="Chart 7">
             <a:extLst>
               <a:ext uri="{FF2B5EF4-FFF2-40B4-BE49-F238E27FC236}">
-                <a16:creationId xmlns:a16="http://schemas.microsoft.com/office/drawing/2014/main" xmlns="" id="{5BD90B63-71A7-8B40-BF50-A7BCDCB97999}"/>
+                <a16:creationId xmlns="" xmlns:a16="http://schemas.microsoft.com/office/drawing/2014/main" id="{5BD90B63-71A7-8B40-BF50-A7BCDCB97999}"/>
               </a:ext>
             </a:extLst>
           </p:cNvPr>
@@ -3589,7 +3588,7 @@
           <p:cNvPr id="10" name="Chart 9">
             <a:extLst>
               <a:ext uri="{FF2B5EF4-FFF2-40B4-BE49-F238E27FC236}">
-                <a16:creationId xmlns:a16="http://schemas.microsoft.com/office/drawing/2014/main" xmlns="" id="{19F98BD7-C6F9-F94E-A45C-D865824FF4CF}"/>
+                <a16:creationId xmlns="" xmlns:a16="http://schemas.microsoft.com/office/drawing/2014/main" id="{19F98BD7-C6F9-F94E-A45C-D865824FF4CF}"/>
               </a:ext>
             </a:extLst>
           </p:cNvPr>
@@ -3617,7 +3616,7 @@
           <p:cNvPr id="12" name="Oval 11">
             <a:extLst>
               <a:ext uri="{FF2B5EF4-FFF2-40B4-BE49-F238E27FC236}">
-                <a16:creationId xmlns:a16="http://schemas.microsoft.com/office/drawing/2014/main" xmlns="" id="{F01FC94A-C2C1-2F45-A8A3-FADCE5AE7EA3}"/>
+                <a16:creationId xmlns="" xmlns:a16="http://schemas.microsoft.com/office/drawing/2014/main" id="{F01FC94A-C2C1-2F45-A8A3-FADCE5AE7EA3}"/>
               </a:ext>
             </a:extLst>
           </p:cNvPr>
@@ -3674,7 +3673,7 @@
           <p:cNvPr id="14" name="Chart 13">
             <a:extLst>
               <a:ext uri="{FF2B5EF4-FFF2-40B4-BE49-F238E27FC236}">
-                <a16:creationId xmlns:a16="http://schemas.microsoft.com/office/drawing/2014/main" xmlns="" id="{32822319-A31E-674D-B49C-56167E086E3A}"/>
+                <a16:creationId xmlns="" xmlns:a16="http://schemas.microsoft.com/office/drawing/2014/main" id="{32822319-A31E-674D-B49C-56167E086E3A}"/>
               </a:ext>
             </a:extLst>
           </p:cNvPr>
@@ -3702,7 +3701,7 @@
           <p:cNvPr id="16" name="Chart 15">
             <a:extLst>
               <a:ext uri="{FF2B5EF4-FFF2-40B4-BE49-F238E27FC236}">
-                <a16:creationId xmlns:a16="http://schemas.microsoft.com/office/drawing/2014/main" xmlns="" id="{750456BF-4904-9140-AE9F-14FA12CBBDF4}"/>
+                <a16:creationId xmlns="" xmlns:a16="http://schemas.microsoft.com/office/drawing/2014/main" id="{750456BF-4904-9140-AE9F-14FA12CBBDF4}"/>
               </a:ext>
             </a:extLst>
           </p:cNvPr>
@@ -3730,7 +3729,7 @@
           <p:cNvPr id="33" name="Chart 32">
             <a:extLst>
               <a:ext uri="{FF2B5EF4-FFF2-40B4-BE49-F238E27FC236}">
-                <a16:creationId xmlns:a16="http://schemas.microsoft.com/office/drawing/2014/main" xmlns="" id="{7C554B7E-A141-0746-9DF5-5423CE03631E}"/>
+                <a16:creationId xmlns="" xmlns:a16="http://schemas.microsoft.com/office/drawing/2014/main" id="{7C554B7E-A141-0746-9DF5-5423CE03631E}"/>
               </a:ext>
             </a:extLst>
           </p:cNvPr>
@@ -3758,7 +3757,7 @@
           <p:cNvPr id="38" name="Content Placeholder 37">
             <a:extLst>
               <a:ext uri="{FF2B5EF4-FFF2-40B4-BE49-F238E27FC236}">
-                <a16:creationId xmlns:a16="http://schemas.microsoft.com/office/drawing/2014/main" xmlns="" id="{8855CF36-9F94-BC46-A2ED-3B521676ED82}"/>
+                <a16:creationId xmlns="" xmlns:a16="http://schemas.microsoft.com/office/drawing/2014/main" id="{8855CF36-9F94-BC46-A2ED-3B521676ED82}"/>
               </a:ext>
             </a:extLst>
           </p:cNvPr>
@@ -3829,7 +3828,7 @@
           <p:cNvPr id="40" name="Content Placeholder 37">
             <a:extLst>
               <a:ext uri="{FF2B5EF4-FFF2-40B4-BE49-F238E27FC236}">
-                <a16:creationId xmlns:a16="http://schemas.microsoft.com/office/drawing/2014/main" xmlns="" id="{56840EF3-68EE-7B4C-8181-39A37456F87A}"/>
+                <a16:creationId xmlns="" xmlns:a16="http://schemas.microsoft.com/office/drawing/2014/main" id="{56840EF3-68EE-7B4C-8181-39A37456F87A}"/>
               </a:ext>
             </a:extLst>
           </p:cNvPr>
@@ -3900,7 +3899,7 @@
           <p:cNvPr id="41" name="Content Placeholder 37">
             <a:extLst>
               <a:ext uri="{FF2B5EF4-FFF2-40B4-BE49-F238E27FC236}">
-                <a16:creationId xmlns:a16="http://schemas.microsoft.com/office/drawing/2014/main" xmlns="" id="{BE98752E-F0B4-A646-A4BB-A0797A9E7AD5}"/>
+                <a16:creationId xmlns="" xmlns:a16="http://schemas.microsoft.com/office/drawing/2014/main" id="{BE98752E-F0B4-A646-A4BB-A0797A9E7AD5}"/>
               </a:ext>
             </a:extLst>
           </p:cNvPr>
@@ -3971,7 +3970,7 @@
           <p:cNvPr id="42" name="Content Placeholder 37">
             <a:extLst>
               <a:ext uri="{FF2B5EF4-FFF2-40B4-BE49-F238E27FC236}">
-                <a16:creationId xmlns:a16="http://schemas.microsoft.com/office/drawing/2014/main" xmlns="" id="{FB391948-D1D3-E844-A7CB-DF5C81809A26}"/>
+                <a16:creationId xmlns="" xmlns:a16="http://schemas.microsoft.com/office/drawing/2014/main" id="{FB391948-D1D3-E844-A7CB-DF5C81809A26}"/>
               </a:ext>
             </a:extLst>
           </p:cNvPr>
@@ -4042,7 +4041,7 @@
           <p:cNvPr id="44" name="Content Placeholder 43">
             <a:extLst>
               <a:ext uri="{FF2B5EF4-FFF2-40B4-BE49-F238E27FC236}">
-                <a16:creationId xmlns:a16="http://schemas.microsoft.com/office/drawing/2014/main" xmlns="" id="{0A77FD66-776F-C246-B929-4A4573947E3C}"/>
+                <a16:creationId xmlns="" xmlns:a16="http://schemas.microsoft.com/office/drawing/2014/main" id="{0A77FD66-776F-C246-B929-4A4573947E3C}"/>
               </a:ext>
             </a:extLst>
           </p:cNvPr>
@@ -4117,7 +4116,7 @@
           <p:cNvPr id="45" name="Content Placeholder 43">
             <a:extLst>
               <a:ext uri="{FF2B5EF4-FFF2-40B4-BE49-F238E27FC236}">
-                <a16:creationId xmlns:a16="http://schemas.microsoft.com/office/drawing/2014/main" xmlns="" id="{1FD80466-BF42-B84B-9C04-D8201D78F40B}"/>
+                <a16:creationId xmlns="" xmlns:a16="http://schemas.microsoft.com/office/drawing/2014/main" id="{1FD80466-BF42-B84B-9C04-D8201D78F40B}"/>
               </a:ext>
             </a:extLst>
           </p:cNvPr>
@@ -4192,7 +4191,7 @@
           <p:cNvPr id="46" name="Content Placeholder 43">
             <a:extLst>
               <a:ext uri="{FF2B5EF4-FFF2-40B4-BE49-F238E27FC236}">
-                <a16:creationId xmlns:a16="http://schemas.microsoft.com/office/drawing/2014/main" xmlns="" id="{392739EB-F3D7-9C43-A372-10E197D51F37}"/>
+                <a16:creationId xmlns="" xmlns:a16="http://schemas.microsoft.com/office/drawing/2014/main" id="{392739EB-F3D7-9C43-A372-10E197D51F37}"/>
               </a:ext>
             </a:extLst>
           </p:cNvPr>
@@ -4267,7 +4266,7 @@
           <p:cNvPr id="47" name="Content Placeholder 43">
             <a:extLst>
               <a:ext uri="{FF2B5EF4-FFF2-40B4-BE49-F238E27FC236}">
-                <a16:creationId xmlns:a16="http://schemas.microsoft.com/office/drawing/2014/main" xmlns="" id="{37614554-1946-0844-8423-DD8A39A527A8}"/>
+                <a16:creationId xmlns="" xmlns:a16="http://schemas.microsoft.com/office/drawing/2014/main" id="{37614554-1946-0844-8423-DD8A39A527A8}"/>
               </a:ext>
             </a:extLst>
           </p:cNvPr>
@@ -4342,7 +4341,7 @@
           <p:cNvPr id="48" name="Content Placeholder 43">
             <a:extLst>
               <a:ext uri="{FF2B5EF4-FFF2-40B4-BE49-F238E27FC236}">
-                <a16:creationId xmlns:a16="http://schemas.microsoft.com/office/drawing/2014/main" xmlns="" id="{FD48B3D2-B6F3-F44F-8BD4-07DDAF9F0714}"/>
+                <a16:creationId xmlns="" xmlns:a16="http://schemas.microsoft.com/office/drawing/2014/main" id="{FD48B3D2-B6F3-F44F-8BD4-07DDAF9F0714}"/>
               </a:ext>
             </a:extLst>
           </p:cNvPr>
@@ -4417,7 +4416,7 @@
           <p:cNvPr id="49" name="Content Placeholder 43">
             <a:extLst>
               <a:ext uri="{FF2B5EF4-FFF2-40B4-BE49-F238E27FC236}">
-                <a16:creationId xmlns:a16="http://schemas.microsoft.com/office/drawing/2014/main" xmlns="" id="{6A1BA731-B6D7-A445-B604-DA56C8935855}"/>
+                <a16:creationId xmlns="" xmlns:a16="http://schemas.microsoft.com/office/drawing/2014/main" id="{6A1BA731-B6D7-A445-B604-DA56C8935855}"/>
               </a:ext>
             </a:extLst>
           </p:cNvPr>
@@ -4492,7 +4491,7 @@
           <p:cNvPr id="4" name="Title 3">
             <a:extLst>
               <a:ext uri="{FF2B5EF4-FFF2-40B4-BE49-F238E27FC236}">
-                <a16:creationId xmlns:a16="http://schemas.microsoft.com/office/drawing/2014/main" xmlns="" id="{FB1F7188-AD07-2945-AFB2-484401665551}"/>
+                <a16:creationId xmlns="" xmlns:a16="http://schemas.microsoft.com/office/drawing/2014/main" id="{FB1F7188-AD07-2945-AFB2-484401665551}"/>
               </a:ext>
             </a:extLst>
           </p:cNvPr>
@@ -4537,7 +4536,7 @@
           <p:cNvPr id="27" name="Oval 26">
             <a:extLst>
               <a:ext uri="{FF2B5EF4-FFF2-40B4-BE49-F238E27FC236}">
-                <a16:creationId xmlns:a16="http://schemas.microsoft.com/office/drawing/2014/main" xmlns="" id="{25A293E4-AB93-714E-8BB0-732CE1A6C429}"/>
+                <a16:creationId xmlns="" xmlns:a16="http://schemas.microsoft.com/office/drawing/2014/main" id="{25A293E4-AB93-714E-8BB0-732CE1A6C429}"/>
               </a:ext>
             </a:extLst>
           </p:cNvPr>
@@ -4594,7 +4593,7 @@
           <p:cNvPr id="29" name="Oval 28">
             <a:extLst>
               <a:ext uri="{FF2B5EF4-FFF2-40B4-BE49-F238E27FC236}">
-                <a16:creationId xmlns:a16="http://schemas.microsoft.com/office/drawing/2014/main" xmlns="" id="{B483EDF3-323C-C249-B088-68241CCAC293}"/>
+                <a16:creationId xmlns="" xmlns:a16="http://schemas.microsoft.com/office/drawing/2014/main" id="{B483EDF3-323C-C249-B088-68241CCAC293}"/>
               </a:ext>
             </a:extLst>
           </p:cNvPr>
@@ -4651,7 +4650,7 @@
           <p:cNvPr id="30" name="Oval 29">
             <a:extLst>
               <a:ext uri="{FF2B5EF4-FFF2-40B4-BE49-F238E27FC236}">
-                <a16:creationId xmlns:a16="http://schemas.microsoft.com/office/drawing/2014/main" xmlns="" id="{97A48942-2498-BD4E-9C7B-37C5A20B9764}"/>
+                <a16:creationId xmlns="" xmlns:a16="http://schemas.microsoft.com/office/drawing/2014/main" id="{97A48942-2498-BD4E-9C7B-37C5A20B9764}"/>
               </a:ext>
             </a:extLst>
           </p:cNvPr>
@@ -4708,7 +4707,7 @@
           <p:cNvPr id="32" name="Oval 31">
             <a:extLst>
               <a:ext uri="{FF2B5EF4-FFF2-40B4-BE49-F238E27FC236}">
-                <a16:creationId xmlns:a16="http://schemas.microsoft.com/office/drawing/2014/main" xmlns="" id="{9068CFED-B55B-924C-83CA-BF9D61A55BA8}"/>
+                <a16:creationId xmlns="" xmlns:a16="http://schemas.microsoft.com/office/drawing/2014/main" id="{9068CFED-B55B-924C-83CA-BF9D61A55BA8}"/>
               </a:ext>
             </a:extLst>
           </p:cNvPr>
@@ -4765,7 +4764,7 @@
           <p:cNvPr id="34" name="Oval 33">
             <a:extLst>
               <a:ext uri="{FF2B5EF4-FFF2-40B4-BE49-F238E27FC236}">
-                <a16:creationId xmlns:a16="http://schemas.microsoft.com/office/drawing/2014/main" xmlns="" id="{A89208FA-25F6-894A-B7D9-199520AA1A5C}"/>
+                <a16:creationId xmlns="" xmlns:a16="http://schemas.microsoft.com/office/drawing/2014/main" id="{A89208FA-25F6-894A-B7D9-199520AA1A5C}"/>
               </a:ext>
             </a:extLst>
           </p:cNvPr>
@@ -4855,119 +4854,6 @@
 </p:sldLayout>
 </file>
 
-<file path=ppt/slideLayouts/slideLayout3.xml><?xml version="1.0" encoding="utf-8"?>
-<p:sldLayout xmlns:a="http://schemas.openxmlformats.org/drawingml/2006/main" xmlns:r="http://schemas.openxmlformats.org/officeDocument/2006/relationships" xmlns:p="http://schemas.openxmlformats.org/presentationml/2006/main" type="blank">
-  <p:cSld name="1_Blank">
-    <p:spTree>
-      <p:nvGrpSpPr>
-        <p:cNvPr id="1" name=""/>
-        <p:cNvGrpSpPr/>
-        <p:nvPr/>
-      </p:nvGrpSpPr>
-      <p:grpSpPr>
-        <a:xfrm>
-          <a:off x="0" y="0"/>
-          <a:ext cx="0" cy="0"/>
-          <a:chOff x="0" y="0"/>
-          <a:chExt cx="0" cy="0"/>
-        </a:xfrm>
-      </p:grpSpPr>
-      <p:sp>
-        <p:nvSpPr>
-          <p:cNvPr id="2" name="Date Placeholder 1">
-            <a:extLst>
-              <a:ext uri="{FF2B5EF4-FFF2-40B4-BE49-F238E27FC236}">
-                <a16:creationId xmlns:a16="http://schemas.microsoft.com/office/drawing/2014/main" xmlns="" id="{F18DBD5F-C6EC-485E-8ECE-A5152736C43A}"/>
-              </a:ext>
-            </a:extLst>
-          </p:cNvPr>
-          <p:cNvSpPr>
-            <a:spLocks noGrp="1"/>
-          </p:cNvSpPr>
-          <p:nvPr>
-            <p:ph type="dt" sz="half" idx="10"/>
-          </p:nvPr>
-        </p:nvSpPr>
-        <p:spPr/>
-        <p:txBody>
-          <a:bodyPr/>
-          <a:lstStyle/>
-          <a:p>
-            <a:fld id="{6EBB0E32-0304-4451-ADB8-C044457D5B85}" type="datetimeFigureOut">
-              <a:rPr lang="en-US" smtClean="0"/>
-              <a:t>6/26/2021</a:t>
-            </a:fld>
-            <a:endParaRPr lang="en-US"/>
-          </a:p>
-        </p:txBody>
-      </p:sp>
-      <p:sp>
-        <p:nvSpPr>
-          <p:cNvPr id="3" name="Footer Placeholder 2">
-            <a:extLst>
-              <a:ext uri="{FF2B5EF4-FFF2-40B4-BE49-F238E27FC236}">
-                <a16:creationId xmlns:a16="http://schemas.microsoft.com/office/drawing/2014/main" xmlns="" id="{FB6C0BE6-E24A-4679-B786-AAB41ADCCD5D}"/>
-              </a:ext>
-            </a:extLst>
-          </p:cNvPr>
-          <p:cNvSpPr>
-            <a:spLocks noGrp="1"/>
-          </p:cNvSpPr>
-          <p:nvPr>
-            <p:ph type="ftr" sz="quarter" idx="11"/>
-          </p:nvPr>
-        </p:nvSpPr>
-        <p:spPr/>
-        <p:txBody>
-          <a:bodyPr/>
-          <a:lstStyle/>
-          <a:p>
-            <a:endParaRPr lang="en-US"/>
-          </a:p>
-        </p:txBody>
-      </p:sp>
-      <p:sp>
-        <p:nvSpPr>
-          <p:cNvPr id="4" name="Slide Number Placeholder 3">
-            <a:extLst>
-              <a:ext uri="{FF2B5EF4-FFF2-40B4-BE49-F238E27FC236}">
-                <a16:creationId xmlns:a16="http://schemas.microsoft.com/office/drawing/2014/main" xmlns="" id="{73FB9417-93D4-4C41-8E0E-1553E0B5D0CE}"/>
-              </a:ext>
-            </a:extLst>
-          </p:cNvPr>
-          <p:cNvSpPr>
-            <a:spLocks noGrp="1"/>
-          </p:cNvSpPr>
-          <p:nvPr>
-            <p:ph type="sldNum" sz="quarter" idx="12"/>
-          </p:nvPr>
-        </p:nvSpPr>
-        <p:spPr/>
-        <p:txBody>
-          <a:bodyPr/>
-          <a:lstStyle/>
-          <a:p>
-            <a:fld id="{DA64F31B-23FA-4075-AF7D-6228CFD12F03}" type="slidenum">
-              <a:rPr lang="en-US" smtClean="0"/>
-              <a:t>‹Nr.›</a:t>
-            </a:fld>
-            <a:endParaRPr lang="en-US"/>
-          </a:p>
-        </p:txBody>
-      </p:sp>
-    </p:spTree>
-    <p:extLst>
-      <p:ext uri="{BB962C8B-B14F-4D97-AF65-F5344CB8AC3E}">
-        <p14:creationId xmlns:p14="http://schemas.microsoft.com/office/powerpoint/2010/main" val="1700010413"/>
-      </p:ext>
-    </p:extLst>
-  </p:cSld>
-  <p:clrMapOvr>
-    <a:masterClrMapping/>
-  </p:clrMapOvr>
-</p:sldLayout>
-</file>
-
 <file path=ppt/slideMasters/slideMaster1.xml><?xml version="1.0" encoding="utf-8"?>
 <p:sldMaster xmlns:a="http://schemas.openxmlformats.org/drawingml/2006/main" xmlns:r="http://schemas.openxmlformats.org/officeDocument/2006/relationships" xmlns:p="http://schemas.openxmlformats.org/presentationml/2006/main">
   <p:cSld>
@@ -4996,7 +4882,6 @@
   <p:sldLayoutIdLst>
     <p:sldLayoutId id="2147483655" r:id="rId1"/>
     <p:sldLayoutId id="2147483656" r:id="rId2"/>
-    <p:sldLayoutId id="2147483657" r:id="rId3"/>
   </p:sldLayoutIdLst>
   <p:txStyles>
     <p:titleStyle>
@@ -5273,7 +5158,7 @@
           <p:cNvPr id="28" name="Content Placeholder 27">
             <a:extLst>
               <a:ext uri="{FF2B5EF4-FFF2-40B4-BE49-F238E27FC236}">
-                <a16:creationId xmlns:a16="http://schemas.microsoft.com/office/drawing/2014/main" xmlns="" id="{F7E35707-22DD-7343-9A8E-76BEB132CD6F}"/>
+                <a16:creationId xmlns="" xmlns:a16="http://schemas.microsoft.com/office/drawing/2014/main" id="{F7E35707-22DD-7343-9A8E-76BEB132CD6F}"/>
               </a:ext>
             </a:extLst>
           </p:cNvPr>
@@ -5303,7 +5188,7 @@
           <p:cNvPr id="29" name="Content Placeholder 28">
             <a:extLst>
               <a:ext uri="{FF2B5EF4-FFF2-40B4-BE49-F238E27FC236}">
-                <a16:creationId xmlns:a16="http://schemas.microsoft.com/office/drawing/2014/main" xmlns="" id="{5B476D46-E22A-C540-96A0-A41C9DEE2828}"/>
+                <a16:creationId xmlns="" xmlns:a16="http://schemas.microsoft.com/office/drawing/2014/main" id="{5B476D46-E22A-C540-96A0-A41C9DEE2828}"/>
               </a:ext>
             </a:extLst>
           </p:cNvPr>
@@ -5328,7 +5213,7 @@
           <p:cNvPr id="30" name="Content Placeholder 29">
             <a:extLst>
               <a:ext uri="{FF2B5EF4-FFF2-40B4-BE49-F238E27FC236}">
-                <a16:creationId xmlns:a16="http://schemas.microsoft.com/office/drawing/2014/main" xmlns="" id="{C2DED982-E0FF-4442-8C47-4BFC298D4D97}"/>
+                <a16:creationId xmlns="" xmlns:a16="http://schemas.microsoft.com/office/drawing/2014/main" id="{C2DED982-E0FF-4442-8C47-4BFC298D4D97}"/>
               </a:ext>
             </a:extLst>
           </p:cNvPr>
@@ -5353,7 +5238,7 @@
           <p:cNvPr id="31" name="Content Placeholder 30">
             <a:extLst>
               <a:ext uri="{FF2B5EF4-FFF2-40B4-BE49-F238E27FC236}">
-                <a16:creationId xmlns:a16="http://schemas.microsoft.com/office/drawing/2014/main" xmlns="" id="{230784E7-A0CE-E148-B938-A36AAE67F56A}"/>
+                <a16:creationId xmlns="" xmlns:a16="http://schemas.microsoft.com/office/drawing/2014/main" id="{230784E7-A0CE-E148-B938-A36AAE67F56A}"/>
               </a:ext>
             </a:extLst>
           </p:cNvPr>
@@ -5378,7 +5263,7 @@
           <p:cNvPr id="32" name="Content Placeholder 31">
             <a:extLst>
               <a:ext uri="{FF2B5EF4-FFF2-40B4-BE49-F238E27FC236}">
-                <a16:creationId xmlns:a16="http://schemas.microsoft.com/office/drawing/2014/main" xmlns="" id="{2F53CDD1-87FC-8044-A622-6BD1D7191A08}"/>
+                <a16:creationId xmlns="" xmlns:a16="http://schemas.microsoft.com/office/drawing/2014/main" id="{2F53CDD1-87FC-8044-A622-6BD1D7191A08}"/>
               </a:ext>
             </a:extLst>
           </p:cNvPr>
@@ -5403,7 +5288,7 @@
           <p:cNvPr id="33" name="Content Placeholder 32">
             <a:extLst>
               <a:ext uri="{FF2B5EF4-FFF2-40B4-BE49-F238E27FC236}">
-                <a16:creationId xmlns:a16="http://schemas.microsoft.com/office/drawing/2014/main" xmlns="" id="{9E3EBD40-EC14-784F-90C0-06CD62E70314}"/>
+                <a16:creationId xmlns="" xmlns:a16="http://schemas.microsoft.com/office/drawing/2014/main" id="{9E3EBD40-EC14-784F-90C0-06CD62E70314}"/>
               </a:ext>
             </a:extLst>
           </p:cNvPr>
@@ -5428,7 +5313,7 @@
           <p:cNvPr id="34" name="Content Placeholder 33">
             <a:extLst>
               <a:ext uri="{FF2B5EF4-FFF2-40B4-BE49-F238E27FC236}">
-                <a16:creationId xmlns:a16="http://schemas.microsoft.com/office/drawing/2014/main" xmlns="" id="{33266928-07F6-874A-AD12-9A1C4E35EC67}"/>
+                <a16:creationId xmlns="" xmlns:a16="http://schemas.microsoft.com/office/drawing/2014/main" id="{33266928-07F6-874A-AD12-9A1C4E35EC67}"/>
               </a:ext>
             </a:extLst>
           </p:cNvPr>
@@ -5453,7 +5338,7 @@
           <p:cNvPr id="35" name="Content Placeholder 34">
             <a:extLst>
               <a:ext uri="{FF2B5EF4-FFF2-40B4-BE49-F238E27FC236}">
-                <a16:creationId xmlns:a16="http://schemas.microsoft.com/office/drawing/2014/main" xmlns="" id="{6C9408A5-4D9E-7444-9C47-A4D790157C44}"/>
+                <a16:creationId xmlns="" xmlns:a16="http://schemas.microsoft.com/office/drawing/2014/main" id="{6C9408A5-4D9E-7444-9C47-A4D790157C44}"/>
               </a:ext>
             </a:extLst>
           </p:cNvPr>
@@ -5478,7 +5363,7 @@
           <p:cNvPr id="36" name="Content Placeholder 35">
             <a:extLst>
               <a:ext uri="{FF2B5EF4-FFF2-40B4-BE49-F238E27FC236}">
-                <a16:creationId xmlns:a16="http://schemas.microsoft.com/office/drawing/2014/main" xmlns="" id="{852E6ADA-DFEF-F342-9C86-8197A628EE05}"/>
+                <a16:creationId xmlns="" xmlns:a16="http://schemas.microsoft.com/office/drawing/2014/main" id="{852E6ADA-DFEF-F342-9C86-8197A628EE05}"/>
               </a:ext>
             </a:extLst>
           </p:cNvPr>
@@ -5503,7 +5388,7 @@
           <p:cNvPr id="27" name="Content Placeholder 26">
             <a:extLst>
               <a:ext uri="{FF2B5EF4-FFF2-40B4-BE49-F238E27FC236}">
-                <a16:creationId xmlns:a16="http://schemas.microsoft.com/office/drawing/2014/main" xmlns="" id="{735544EB-76A6-694A-A7C1-E2F59AF52025}"/>
+                <a16:creationId xmlns="" xmlns:a16="http://schemas.microsoft.com/office/drawing/2014/main" id="{735544EB-76A6-694A-A7C1-E2F59AF52025}"/>
               </a:ext>
             </a:extLst>
           </p:cNvPr>
@@ -5533,7 +5418,7 @@
           <p:cNvPr id="26" name="Title 25">
             <a:extLst>
               <a:ext uri="{FF2B5EF4-FFF2-40B4-BE49-F238E27FC236}">
-                <a16:creationId xmlns:a16="http://schemas.microsoft.com/office/drawing/2014/main" xmlns="" id="{706A3426-75AF-5B40-8230-C4DE69BFC991}"/>
+                <a16:creationId xmlns="" xmlns:a16="http://schemas.microsoft.com/office/drawing/2014/main" id="{706A3426-75AF-5B40-8230-C4DE69BFC991}"/>
               </a:ext>
             </a:extLst>
           </p:cNvPr>
@@ -5560,103 +5445,6 @@
     <p:extLst>
       <p:ext uri="{BB962C8B-B14F-4D97-AF65-F5344CB8AC3E}">
         <p14:creationId xmlns:p14="http://schemas.microsoft.com/office/powerpoint/2010/main" val="2877471297"/>
-      </p:ext>
-    </p:extLst>
-  </p:cSld>
-  <p:clrMapOvr>
-    <a:masterClrMapping/>
-  </p:clrMapOvr>
-</p:sld>
-</file>
-
-<file path=ppt/slides/slide2.xml><?xml version="1.0" encoding="utf-8"?>
-<p:sld xmlns:a="http://schemas.openxmlformats.org/drawingml/2006/main" xmlns:r="http://schemas.openxmlformats.org/officeDocument/2006/relationships" xmlns:p="http://schemas.openxmlformats.org/presentationml/2006/main">
-  <p:cSld>
-    <p:spTree>
-      <p:nvGrpSpPr>
-        <p:cNvPr id="1" name=""/>
-        <p:cNvGrpSpPr/>
-        <p:nvPr/>
-      </p:nvGrpSpPr>
-      <p:grpSpPr>
-        <a:xfrm>
-          <a:off x="0" y="0"/>
-          <a:ext cx="0" cy="0"/>
-          <a:chOff x="0" y="0"/>
-          <a:chExt cx="0" cy="0"/>
-        </a:xfrm>
-      </p:grpSpPr>
-      <p:sp>
-        <p:nvSpPr>
-          <p:cNvPr id="4" name="TextBox 3">
-            <a:extLst>
-              <a:ext uri="{FF2B5EF4-FFF2-40B4-BE49-F238E27FC236}">
-                <a16:creationId xmlns:a16="http://schemas.microsoft.com/office/drawing/2014/main" xmlns="" id="{C542A917-2DC0-41C3-A1A8-3D1A5C65E9C5}"/>
-              </a:ext>
-            </a:extLst>
-          </p:cNvPr>
-          <p:cNvSpPr txBox="1"/>
-          <p:nvPr/>
-        </p:nvSpPr>
-        <p:spPr>
-          <a:xfrm>
-            <a:off x="1601371" y="3105920"/>
-            <a:ext cx="8989258" cy="1200016"/>
-          </a:xfrm>
-          <a:prstGeom prst="rect">
-            <a:avLst/>
-          </a:prstGeom>
-          <a:noFill/>
-        </p:spPr>
-        <p:txBody>
-          <a:bodyPr wrap="square" rtlCol="0">
-            <a:spAutoFit/>
-          </a:bodyPr>
-          <a:lstStyle/>
-          <a:p>
-            <a:pPr algn="ctr"/>
-            <a:r>
-              <a:rPr lang="en-US" sz="3599" b="1" dirty="0">
-                <a:latin typeface="+mj-lt"/>
-                <a:cs typeface="Arial" panose="020B0604020202020204" pitchFamily="34" charset="0"/>
-                <a:hlinkClick r:id="rId2">
-                  <a:extLst>
-                    <a:ext uri="{A12FA001-AC4F-418D-AE19-62706E023703}">
-                      <ahyp:hlinkClr xmlns:ahyp="http://schemas.microsoft.com/office/drawing/2018/hyperlinkcolor" xmlns="" val="tx"/>
-                    </a:ext>
-                  </a:extLst>
-                </a:hlinkClick>
-              </a:rPr>
-              <a:t>Template editing instructions </a:t>
-            </a:r>
-          </a:p>
-          <a:p>
-            <a:pPr algn="ctr"/>
-            <a:r>
-              <a:rPr lang="en-US" sz="3599" b="1" dirty="0">
-                <a:latin typeface="+mj-lt"/>
-                <a:cs typeface="Arial" panose="020B0604020202020204" pitchFamily="34" charset="0"/>
-                <a:hlinkClick r:id="rId2">
-                  <a:extLst>
-                    <a:ext uri="{A12FA001-AC4F-418D-AE19-62706E023703}">
-                      <ahyp:hlinkClr xmlns:ahyp="http://schemas.microsoft.com/office/drawing/2018/hyperlinkcolor" xmlns="" val="tx"/>
-                    </a:ext>
-                  </a:extLst>
-                </a:hlinkClick>
-              </a:rPr>
-              <a:t>and feedback</a:t>
-            </a:r>
-            <a:endParaRPr lang="en-US" sz="3599" b="1" dirty="0">
-              <a:latin typeface="+mj-lt"/>
-              <a:cs typeface="Arial" panose="020B0604020202020204" pitchFamily="34" charset="0"/>
-            </a:endParaRPr>
-          </a:p>
-        </p:txBody>
-      </p:sp>
-    </p:spTree>
-    <p:extLst>
-      <p:ext uri="{BB962C8B-B14F-4D97-AF65-F5344CB8AC3E}">
-        <p14:creationId xmlns:p14="http://schemas.microsoft.com/office/powerpoint/2010/main" val="917409932"/>
       </p:ext>
     </p:extLst>
   </p:cSld>
@@ -5950,7 +5738,7 @@
   <a:extraClrSchemeLst/>
   <a:extLst>
     <a:ext uri="{05A4C25C-085E-4340-85A3-A5531E510DB2}">
-      <thm15:themeFamily xmlns:thm15="http://schemas.microsoft.com/office/thememl/2012/main" xmlns="" name="Multi chart dashboardTF34119396.potx" id="{7F9BCE07-C30E-4038-BDD0-A0D08626B77B}" vid="{7315B0B1-3D0B-43A1-90F4-C4752C65122E}"/>
+      <thm15:themeFamily xmlns="" xmlns:thm15="http://schemas.microsoft.com/office/thememl/2012/main" name="Multi chart dashboardTF34119396.potx" id="{7F9BCE07-C30E-4038-BDD0-A0D08626B77B}" vid="{7315B0B1-3D0B-43A1-90F4-C4752C65122E}"/>
     </a:ext>
   </a:extLst>
 </a:theme>

</xml_diff>